<commit_message>
modify doc for 0416
</commit_message>
<xml_diff>
--- a/Proj 183 Zcore TEE-OS - 0416.pptx
+++ b/Proj 183 Zcore TEE-OS - 0416.pptx
@@ -106,6 +106,11 @@
       </a:defRPr>
     </a:lvl9pPr>
   </p:defaultTextStyle>
+  <p:extLst>
+    <p:ext uri="{EFAFB233-063F-42B5-8137-9DF3F51BA10A}">
+      <p15:sldGuideLst xmlns:p15="http://schemas.microsoft.com/office/powerpoint/2012/main"/>
+    </p:ext>
+  </p:extLst>
 </p:presentation>
 </file>
 
@@ -3978,32 +3983,155 @@
           <a:bodyPr/>
           <a:lstStyle/>
           <a:p>
+            <a:r>
+              <a:rPr lang="zh-CN" altLang="en-US" dirty="0"/>
+              <a:t>进度规划</a:t>
+            </a:r>
+          </a:p>
+        </p:txBody>
+      </p:sp>
+      <p:sp>
+        <p:nvSpPr>
+          <p:cNvPr id="3" name="内容占位符 2">
+            <a:extLst>
+              <a:ext uri="{FF2B5EF4-FFF2-40B4-BE49-F238E27FC236}">
+                <a16:creationId xmlns:a16="http://schemas.microsoft.com/office/drawing/2014/main" id="{19F5D02C-B659-4550-9A16-23BBB309073C}"/>
+              </a:ext>
+            </a:extLst>
+          </p:cNvPr>
+          <p:cNvSpPr>
+            <a:spLocks noGrp="1"/>
+          </p:cNvSpPr>
+          <p:nvPr>
+            <p:ph idx="1"/>
+          </p:nvPr>
+        </p:nvSpPr>
+        <p:spPr/>
+        <p:txBody>
+          <a:bodyPr/>
+          <a:lstStyle/>
+          <a:p>
+            <a:r>
+              <a:rPr lang="zh-CN" altLang="en-US" b="0" i="0" dirty="0">
+                <a:effectLst/>
+                <a:latin typeface="-apple-system"/>
+              </a:rPr>
+              <a:t>在</a:t>
+            </a:r>
+            <a:r>
+              <a:rPr lang="en-US" altLang="zh-CN" b="0" i="0" dirty="0">
+                <a:effectLst/>
+                <a:latin typeface="-apple-system"/>
+              </a:rPr>
+              <a:t>ARM secure world </a:t>
+            </a:r>
+            <a:r>
+              <a:rPr lang="zh-CN" altLang="en-US" b="0" i="0" dirty="0">
+                <a:effectLst/>
+                <a:latin typeface="-apple-system"/>
+              </a:rPr>
+              <a:t>移植</a:t>
+            </a:r>
+            <a:r>
+              <a:rPr lang="en-US" altLang="zh-CN" b="0" i="0" dirty="0" err="1">
+                <a:effectLst/>
+                <a:latin typeface="-apple-system"/>
+              </a:rPr>
+              <a:t>zCore</a:t>
+            </a:r>
+            <a:r>
+              <a:rPr lang="zh-CN" altLang="en-US" b="0" i="0" dirty="0">
+                <a:effectLst/>
+                <a:latin typeface="-apple-system"/>
+              </a:rPr>
+              <a:t>（下周内要完成，可以多问杨德睿学长和贾越凯学长）</a:t>
+            </a:r>
+            <a:endParaRPr lang="en-US" altLang="zh-CN" b="0" i="0" dirty="0">
+              <a:effectLst/>
+              <a:latin typeface="-apple-system"/>
+            </a:endParaRPr>
+          </a:p>
+          <a:p>
+            <a:r>
+              <a:rPr lang="zh-CN" altLang="en-US" b="0" i="0" dirty="0">
+                <a:effectLst/>
+                <a:latin typeface="-apple-system"/>
+              </a:rPr>
+              <a:t>通过 </a:t>
+            </a:r>
+            <a:r>
+              <a:rPr lang="en-US" altLang="zh-CN" b="0" i="0" dirty="0">
+                <a:effectLst/>
+                <a:latin typeface="-apple-system"/>
+              </a:rPr>
+              <a:t>shared memory </a:t>
+            </a:r>
+            <a:r>
+              <a:rPr lang="zh-CN" altLang="en-US" b="0" i="0" dirty="0">
+                <a:effectLst/>
+                <a:latin typeface="-apple-system"/>
+              </a:rPr>
+              <a:t>设计实现</a:t>
+            </a:r>
+            <a:r>
+              <a:rPr lang="en-US" altLang="zh-CN" b="0" i="0" dirty="0">
+                <a:effectLst/>
+                <a:latin typeface="-apple-system"/>
+              </a:rPr>
+              <a:t>REE/TEE</a:t>
+            </a:r>
+            <a:r>
+              <a:rPr lang="zh-CN" altLang="en-US" b="0" i="0" dirty="0">
+                <a:effectLst/>
+                <a:latin typeface="-apple-system"/>
+              </a:rPr>
+              <a:t>的</a:t>
+            </a:r>
+            <a:r>
+              <a:rPr lang="en-US" altLang="zh-CN" b="0" i="0" dirty="0">
+                <a:effectLst/>
+                <a:latin typeface="-apple-system"/>
+              </a:rPr>
+              <a:t>IPC</a:t>
+            </a:r>
+            <a:r>
+              <a:rPr lang="zh-CN" altLang="en-US" b="0" i="0" dirty="0">
+                <a:effectLst/>
+                <a:latin typeface="-apple-system"/>
+              </a:rPr>
+              <a:t>，</a:t>
+            </a:r>
+            <a:r>
+              <a:rPr lang="zh-CN" altLang="en-US" dirty="0">
+                <a:latin typeface="-apple-system"/>
+              </a:rPr>
+              <a:t>自行设计对应的</a:t>
+            </a:r>
+            <a:r>
+              <a:rPr lang="en-US" altLang="zh-CN" dirty="0">
+                <a:latin typeface="-apple-system"/>
+              </a:rPr>
+              <a:t>demo</a:t>
+            </a:r>
+            <a:r>
+              <a:rPr lang="zh-CN" altLang="en-US" dirty="0">
+                <a:latin typeface="-apple-system"/>
+              </a:rPr>
+              <a:t>和测例（也需要多问助教和学长）</a:t>
+            </a:r>
+            <a:endParaRPr lang="en-US" altLang="zh-CN" b="0" i="0" dirty="0">
+              <a:effectLst/>
+              <a:latin typeface="-apple-system"/>
+            </a:endParaRPr>
+          </a:p>
+          <a:p>
+            <a:endParaRPr lang="en-US" altLang="zh-CN" b="0" i="0" dirty="0">
+              <a:effectLst/>
+              <a:latin typeface="-apple-system"/>
+            </a:endParaRPr>
+          </a:p>
+          <a:p>
             <a:endParaRPr lang="zh-CN" altLang="en-US" dirty="0"/>
-          </a:p>
-        </p:txBody>
-      </p:sp>
-      <p:sp>
-        <p:nvSpPr>
-          <p:cNvPr id="3" name="内容占位符 2">
-            <a:extLst>
-              <a:ext uri="{FF2B5EF4-FFF2-40B4-BE49-F238E27FC236}">
-                <a16:creationId xmlns:a16="http://schemas.microsoft.com/office/drawing/2014/main" id="{19F5D02C-B659-4550-9A16-23BBB309073C}"/>
-              </a:ext>
-            </a:extLst>
-          </p:cNvPr>
-          <p:cNvSpPr>
-            <a:spLocks noGrp="1"/>
-          </p:cNvSpPr>
-          <p:nvPr>
-            <p:ph idx="1"/>
-          </p:nvPr>
-        </p:nvSpPr>
-        <p:spPr/>
-        <p:txBody>
-          <a:bodyPr/>
-          <a:lstStyle/>
-          <a:p>
-            <a:endParaRPr lang="zh-CN" altLang="en-US"/>
           </a:p>
         </p:txBody>
       </p:sp>

</xml_diff>